<commit_message>
Added Recommendations to the client section
</commit_message>
<xml_diff>
--- a/caption_report.pptx
+++ b/caption_report.pptx
@@ -1,9 +1,12 @@
 
 <file path=ppt/presentation.xml><?xml version="1.0" encoding="utf-8"?>
-<p:presentation xmlns:a="http://schemas.openxmlformats.org/drawingml/2006/main" xmlns:r="http://schemas.openxmlformats.org/officeDocument/2006/relationships" xmlns:p="http://schemas.openxmlformats.org/presentationml/2006/main" autoCompressPictures="0">
+<p:presentation xmlns:a="http://schemas.openxmlformats.org/drawingml/2006/main" xmlns:r="http://schemas.openxmlformats.org/officeDocument/2006/relationships" xmlns:p="http://schemas.openxmlformats.org/presentationml/2006/main" showSpecialPlsOnTitleSld="0" autoCompressPictures="0">
   <p:sldMasterIdLst>
     <p:sldMasterId id="2147483648" r:id="rId1"/>
   </p:sldMasterIdLst>
+  <p:notesMasterIdLst>
+    <p:notesMasterId r:id="rId11"/>
+  </p:notesMasterIdLst>
   <p:sldIdLst>
     <p:sldId id="256" r:id="rId2"/>
     <p:sldId id="258" r:id="rId3"/>
@@ -13,6 +16,7 @@
     <p:sldId id="318" r:id="rId7"/>
     <p:sldId id="319" r:id="rId8"/>
     <p:sldId id="320" r:id="rId9"/>
+    <p:sldId id="321" r:id="rId10"/>
   </p:sldIdLst>
   <p:sldSz cx="12192000" cy="6858000"/>
   <p:notesSz cx="6858000" cy="9144000"/>
@@ -122,7 +126,7 @@
 <file path=ppt/revisionInfo.xml><?xml version="1.0" encoding="utf-8"?>
 <p1510:revInfo xmlns:a="http://schemas.openxmlformats.org/drawingml/2006/main" xmlns:r="http://schemas.openxmlformats.org/officeDocument/2006/relationships" xmlns:p1510="http://schemas.microsoft.com/office/powerpoint/2015/10/main">
   <p1510:revLst>
-    <p1510:client id="{C080776A-1616-43FD-A763-C7C40DC5C439}" v="23" dt="2019-11-08T23:53:27.463"/>
+    <p1510:client id="{C080776A-1616-43FD-A763-C7C40DC5C439}" v="33" dt="2019-11-09T00:52:41.970"/>
   </p1510:revLst>
 </p1510:revInfo>
 </file>
@@ -266,7 +270,403 @@
       </pc:sldChg>
     </pc:docChg>
   </pc:docChgLst>
+  <pc:docChgLst>
+    <pc:chgData name="Raj V" userId="58c9507ec7e87cfb" providerId="LiveId" clId="{C080776A-1616-43FD-A763-C7C40DC5C439}"/>
+    <pc:docChg chg="custSel addSld modSld">
+      <pc:chgData name="Raj V" userId="58c9507ec7e87cfb" providerId="LiveId" clId="{C080776A-1616-43FD-A763-C7C40DC5C439}" dt="2019-11-09T00:53:19.238" v="210" actId="20577"/>
+      <pc:docMkLst>
+        <pc:docMk/>
+      </pc:docMkLst>
+      <pc:sldChg chg="addSp delSp modSp">
+        <pc:chgData name="Raj V" userId="58c9507ec7e87cfb" providerId="LiveId" clId="{C080776A-1616-43FD-A763-C7C40DC5C439}" dt="2019-11-09T00:38:54.055" v="1"/>
+        <pc:sldMkLst>
+          <pc:docMk/>
+          <pc:sldMk cId="2211167120" sldId="320"/>
+        </pc:sldMkLst>
+        <pc:spChg chg="add del mod">
+          <ac:chgData name="Raj V" userId="58c9507ec7e87cfb" providerId="LiveId" clId="{C080776A-1616-43FD-A763-C7C40DC5C439}" dt="2019-11-09T00:38:54.055" v="1"/>
+          <ac:spMkLst>
+            <pc:docMk/>
+            <pc:sldMk cId="2211167120" sldId="320"/>
+            <ac:spMk id="3" creationId="{8761DD0D-9A37-40B7-968B-8A3E6D82A7C2}"/>
+          </ac:spMkLst>
+        </pc:spChg>
+      </pc:sldChg>
+      <pc:sldChg chg="modSp add">
+        <pc:chgData name="Raj V" userId="58c9507ec7e87cfb" providerId="LiveId" clId="{C080776A-1616-43FD-A763-C7C40DC5C439}" dt="2019-11-09T00:53:19.238" v="210" actId="20577"/>
+        <pc:sldMkLst>
+          <pc:docMk/>
+          <pc:sldMk cId="811417787" sldId="321"/>
+        </pc:sldMkLst>
+        <pc:spChg chg="mod">
+          <ac:chgData name="Raj V" userId="58c9507ec7e87cfb" providerId="LiveId" clId="{C080776A-1616-43FD-A763-C7C40DC5C439}" dt="2019-11-09T00:46:11.032" v="3"/>
+          <ac:spMkLst>
+            <pc:docMk/>
+            <pc:sldMk cId="811417787" sldId="321"/>
+            <ac:spMk id="2" creationId="{4B27EB5E-D4FF-48D4-8920-5A742118B292}"/>
+          </ac:spMkLst>
+        </pc:spChg>
+        <pc:spChg chg="mod">
+          <ac:chgData name="Raj V" userId="58c9507ec7e87cfb" providerId="LiveId" clId="{C080776A-1616-43FD-A763-C7C40DC5C439}" dt="2019-11-09T00:53:19.238" v="210" actId="20577"/>
+          <ac:spMkLst>
+            <pc:docMk/>
+            <pc:sldMk cId="811417787" sldId="321"/>
+            <ac:spMk id="4" creationId="{A6B6AFB3-D7D5-44EC-A312-CD08B1EBA93D}"/>
+          </ac:spMkLst>
+        </pc:spChg>
+      </pc:sldChg>
+    </pc:docChg>
+  </pc:docChgLst>
 </pc:chgInfo>
+</file>
+
+<file path=ppt/notesMasters/notesMaster1.xml><?xml version="1.0" encoding="utf-8"?>
+<p:notesMaster xmlns:a="http://schemas.openxmlformats.org/drawingml/2006/main" xmlns:r="http://schemas.openxmlformats.org/officeDocument/2006/relationships" xmlns:p="http://schemas.openxmlformats.org/presentationml/2006/main">
+  <p:cSld>
+    <p:bg>
+      <p:bgRef idx="1001">
+        <a:schemeClr val="bg1"/>
+      </p:bgRef>
+    </p:bg>
+    <p:spTree>
+      <p:nvGrpSpPr>
+        <p:cNvPr id="1" name=""/>
+        <p:cNvGrpSpPr/>
+        <p:nvPr/>
+      </p:nvGrpSpPr>
+      <p:grpSpPr>
+        <a:xfrm>
+          <a:off x="0" y="0"/>
+          <a:ext cx="0" cy="0"/>
+          <a:chOff x="0" y="0"/>
+          <a:chExt cx="0" cy="0"/>
+        </a:xfrm>
+      </p:grpSpPr>
+      <p:sp>
+        <p:nvSpPr>
+          <p:cNvPr id="2" name="Header Placeholder 1"/>
+          <p:cNvSpPr>
+            <a:spLocks noGrp="1"/>
+          </p:cNvSpPr>
+          <p:nvPr>
+            <p:ph type="hdr" sz="quarter"/>
+          </p:nvPr>
+        </p:nvSpPr>
+        <p:spPr>
+          <a:xfrm>
+            <a:off x="0" y="0"/>
+            <a:ext cx="2971800" cy="458788"/>
+          </a:xfrm>
+          <a:prstGeom prst="rect">
+            <a:avLst/>
+          </a:prstGeom>
+        </p:spPr>
+        <p:txBody>
+          <a:bodyPr vert="horz" lIns="91440" tIns="45720" rIns="91440" bIns="45720" rtlCol="0"/>
+          <a:lstStyle>
+            <a:lvl1pPr algn="l">
+              <a:defRPr sz="1200"/>
+            </a:lvl1pPr>
+          </a:lstStyle>
+          <a:p>
+            <a:endParaRPr lang="en-US"/>
+          </a:p>
+        </p:txBody>
+      </p:sp>
+      <p:sp>
+        <p:nvSpPr>
+          <p:cNvPr id="3" name="Date Placeholder 2"/>
+          <p:cNvSpPr>
+            <a:spLocks noGrp="1"/>
+          </p:cNvSpPr>
+          <p:nvPr>
+            <p:ph type="dt" idx="1"/>
+          </p:nvPr>
+        </p:nvSpPr>
+        <p:spPr>
+          <a:xfrm>
+            <a:off x="3884613" y="0"/>
+            <a:ext cx="2971800" cy="458788"/>
+          </a:xfrm>
+          <a:prstGeom prst="rect">
+            <a:avLst/>
+          </a:prstGeom>
+        </p:spPr>
+        <p:txBody>
+          <a:bodyPr vert="horz" lIns="91440" tIns="45720" rIns="91440" bIns="45720" rtlCol="0"/>
+          <a:lstStyle>
+            <a:lvl1pPr algn="r">
+              <a:defRPr sz="1200"/>
+            </a:lvl1pPr>
+          </a:lstStyle>
+          <a:p>
+            <a:fld id="{7C0A715E-A8DC-4FFD-8BCA-2CE4348B4DCB}" type="datetimeFigureOut">
+              <a:rPr lang="en-US" smtClean="0"/>
+              <a:t>11/8/2019</a:t>
+            </a:fld>
+            <a:endParaRPr lang="en-US"/>
+          </a:p>
+        </p:txBody>
+      </p:sp>
+      <p:sp>
+        <p:nvSpPr>
+          <p:cNvPr id="4" name="Slide Image Placeholder 3"/>
+          <p:cNvSpPr>
+            <a:spLocks noGrp="1" noRot="1" noChangeAspect="1"/>
+          </p:cNvSpPr>
+          <p:nvPr>
+            <p:ph type="sldImg" idx="2"/>
+          </p:nvPr>
+        </p:nvSpPr>
+        <p:spPr>
+          <a:xfrm>
+            <a:off x="685800" y="1143000"/>
+            <a:ext cx="5486400" cy="3086100"/>
+          </a:xfrm>
+          <a:prstGeom prst="rect">
+            <a:avLst/>
+          </a:prstGeom>
+          <a:noFill/>
+          <a:ln w="12700">
+            <a:solidFill>
+              <a:prstClr val="black"/>
+            </a:solidFill>
+          </a:ln>
+        </p:spPr>
+        <p:txBody>
+          <a:bodyPr vert="horz" lIns="91440" tIns="45720" rIns="91440" bIns="45720" rtlCol="0" anchor="ctr"/>
+          <a:lstStyle/>
+          <a:p>
+            <a:endParaRPr lang="en-US"/>
+          </a:p>
+        </p:txBody>
+      </p:sp>
+      <p:sp>
+        <p:nvSpPr>
+          <p:cNvPr id="5" name="Notes Placeholder 4"/>
+          <p:cNvSpPr>
+            <a:spLocks noGrp="1"/>
+          </p:cNvSpPr>
+          <p:nvPr>
+            <p:ph type="body" sz="quarter" idx="3"/>
+          </p:nvPr>
+        </p:nvSpPr>
+        <p:spPr>
+          <a:xfrm>
+            <a:off x="685800" y="4400550"/>
+            <a:ext cx="5486400" cy="3600450"/>
+          </a:xfrm>
+          <a:prstGeom prst="rect">
+            <a:avLst/>
+          </a:prstGeom>
+        </p:spPr>
+        <p:txBody>
+          <a:bodyPr vert="horz" lIns="91440" tIns="45720" rIns="91440" bIns="45720" rtlCol="0"/>
+          <a:lstStyle/>
+          <a:p>
+            <a:pPr lvl="0"/>
+            <a:r>
+              <a:rPr lang="en-US"/>
+              <a:t>Click to edit Master text styles</a:t>
+            </a:r>
+          </a:p>
+          <a:p>
+            <a:pPr lvl="1"/>
+            <a:r>
+              <a:rPr lang="en-US"/>
+              <a:t>Second level</a:t>
+            </a:r>
+          </a:p>
+          <a:p>
+            <a:pPr lvl="2"/>
+            <a:r>
+              <a:rPr lang="en-US"/>
+              <a:t>Third level</a:t>
+            </a:r>
+          </a:p>
+          <a:p>
+            <a:pPr lvl="3"/>
+            <a:r>
+              <a:rPr lang="en-US"/>
+              <a:t>Fourth level</a:t>
+            </a:r>
+          </a:p>
+          <a:p>
+            <a:pPr lvl="4"/>
+            <a:r>
+              <a:rPr lang="en-US"/>
+              <a:t>Fifth level</a:t>
+            </a:r>
+          </a:p>
+        </p:txBody>
+      </p:sp>
+      <p:sp>
+        <p:nvSpPr>
+          <p:cNvPr id="6" name="Footer Placeholder 5"/>
+          <p:cNvSpPr>
+            <a:spLocks noGrp="1"/>
+          </p:cNvSpPr>
+          <p:nvPr>
+            <p:ph type="ftr" sz="quarter" idx="4"/>
+          </p:nvPr>
+        </p:nvSpPr>
+        <p:spPr>
+          <a:xfrm>
+            <a:off x="0" y="8685213"/>
+            <a:ext cx="2971800" cy="458787"/>
+          </a:xfrm>
+          <a:prstGeom prst="rect">
+            <a:avLst/>
+          </a:prstGeom>
+        </p:spPr>
+        <p:txBody>
+          <a:bodyPr vert="horz" lIns="91440" tIns="45720" rIns="91440" bIns="45720" rtlCol="0" anchor="b"/>
+          <a:lstStyle>
+            <a:lvl1pPr algn="l">
+              <a:defRPr sz="1200"/>
+            </a:lvl1pPr>
+          </a:lstStyle>
+          <a:p>
+            <a:endParaRPr lang="en-US"/>
+          </a:p>
+        </p:txBody>
+      </p:sp>
+      <p:sp>
+        <p:nvSpPr>
+          <p:cNvPr id="7" name="Slide Number Placeholder 6"/>
+          <p:cNvSpPr>
+            <a:spLocks noGrp="1"/>
+          </p:cNvSpPr>
+          <p:nvPr>
+            <p:ph type="sldNum" sz="quarter" idx="5"/>
+          </p:nvPr>
+        </p:nvSpPr>
+        <p:spPr>
+          <a:xfrm>
+            <a:off x="3884613" y="8685213"/>
+            <a:ext cx="2971800" cy="458787"/>
+          </a:xfrm>
+          <a:prstGeom prst="rect">
+            <a:avLst/>
+          </a:prstGeom>
+        </p:spPr>
+        <p:txBody>
+          <a:bodyPr vert="horz" lIns="91440" tIns="45720" rIns="91440" bIns="45720" rtlCol="0" anchor="b"/>
+          <a:lstStyle>
+            <a:lvl1pPr algn="r">
+              <a:defRPr sz="1200"/>
+            </a:lvl1pPr>
+          </a:lstStyle>
+          <a:p>
+            <a:fld id="{C862315B-9E55-46FE-BC0C-E9F0799915B8}" type="slidenum">
+              <a:rPr lang="en-US" smtClean="0"/>
+              <a:t>‹#›</a:t>
+            </a:fld>
+            <a:endParaRPr lang="en-US"/>
+          </a:p>
+        </p:txBody>
+      </p:sp>
+    </p:spTree>
+    <p:extLst>
+      <p:ext uri="{BB962C8B-B14F-4D97-AF65-F5344CB8AC3E}">
+        <p14:creationId xmlns:p14="http://schemas.microsoft.com/office/powerpoint/2010/main" val="1555287112"/>
+      </p:ext>
+    </p:extLst>
+  </p:cSld>
+  <p:clrMap bg1="lt1" tx1="dk1" bg2="lt2" tx2="dk2" accent1="accent1" accent2="accent2" accent3="accent3" accent4="accent4" accent5="accent5" accent6="accent6" hlink="hlink" folHlink="folHlink"/>
+  <p:notesStyle>
+    <a:lvl1pPr marL="0" algn="l" defTabSz="914400" rtl="0" eaLnBrk="1" latinLnBrk="0" hangingPunct="1">
+      <a:defRPr sz="1200" kern="1200">
+        <a:solidFill>
+          <a:schemeClr val="tx1"/>
+        </a:solidFill>
+        <a:latin typeface="+mn-lt"/>
+        <a:ea typeface="+mn-ea"/>
+        <a:cs typeface="+mn-cs"/>
+      </a:defRPr>
+    </a:lvl1pPr>
+    <a:lvl2pPr marL="457200" algn="l" defTabSz="914400" rtl="0" eaLnBrk="1" latinLnBrk="0" hangingPunct="1">
+      <a:defRPr sz="1200" kern="1200">
+        <a:solidFill>
+          <a:schemeClr val="tx1"/>
+        </a:solidFill>
+        <a:latin typeface="+mn-lt"/>
+        <a:ea typeface="+mn-ea"/>
+        <a:cs typeface="+mn-cs"/>
+      </a:defRPr>
+    </a:lvl2pPr>
+    <a:lvl3pPr marL="914400" algn="l" defTabSz="914400" rtl="0" eaLnBrk="1" latinLnBrk="0" hangingPunct="1">
+      <a:defRPr sz="1200" kern="1200">
+        <a:solidFill>
+          <a:schemeClr val="tx1"/>
+        </a:solidFill>
+        <a:latin typeface="+mn-lt"/>
+        <a:ea typeface="+mn-ea"/>
+        <a:cs typeface="+mn-cs"/>
+      </a:defRPr>
+    </a:lvl3pPr>
+    <a:lvl4pPr marL="1371600" algn="l" defTabSz="914400" rtl="0" eaLnBrk="1" latinLnBrk="0" hangingPunct="1">
+      <a:defRPr sz="1200" kern="1200">
+        <a:solidFill>
+          <a:schemeClr val="tx1"/>
+        </a:solidFill>
+        <a:latin typeface="+mn-lt"/>
+        <a:ea typeface="+mn-ea"/>
+        <a:cs typeface="+mn-cs"/>
+      </a:defRPr>
+    </a:lvl4pPr>
+    <a:lvl5pPr marL="1828800" algn="l" defTabSz="914400" rtl="0" eaLnBrk="1" latinLnBrk="0" hangingPunct="1">
+      <a:defRPr sz="1200" kern="1200">
+        <a:solidFill>
+          <a:schemeClr val="tx1"/>
+        </a:solidFill>
+        <a:latin typeface="+mn-lt"/>
+        <a:ea typeface="+mn-ea"/>
+        <a:cs typeface="+mn-cs"/>
+      </a:defRPr>
+    </a:lvl5pPr>
+    <a:lvl6pPr marL="2286000" algn="l" defTabSz="914400" rtl="0" eaLnBrk="1" latinLnBrk="0" hangingPunct="1">
+      <a:defRPr sz="1200" kern="1200">
+        <a:solidFill>
+          <a:schemeClr val="tx1"/>
+        </a:solidFill>
+        <a:latin typeface="+mn-lt"/>
+        <a:ea typeface="+mn-ea"/>
+        <a:cs typeface="+mn-cs"/>
+      </a:defRPr>
+    </a:lvl6pPr>
+    <a:lvl7pPr marL="2743200" algn="l" defTabSz="914400" rtl="0" eaLnBrk="1" latinLnBrk="0" hangingPunct="1">
+      <a:defRPr sz="1200" kern="1200">
+        <a:solidFill>
+          <a:schemeClr val="tx1"/>
+        </a:solidFill>
+        <a:latin typeface="+mn-lt"/>
+        <a:ea typeface="+mn-ea"/>
+        <a:cs typeface="+mn-cs"/>
+      </a:defRPr>
+    </a:lvl7pPr>
+    <a:lvl8pPr marL="3200400" algn="l" defTabSz="914400" rtl="0" eaLnBrk="1" latinLnBrk="0" hangingPunct="1">
+      <a:defRPr sz="1200" kern="1200">
+        <a:solidFill>
+          <a:schemeClr val="tx1"/>
+        </a:solidFill>
+        <a:latin typeface="+mn-lt"/>
+        <a:ea typeface="+mn-ea"/>
+        <a:cs typeface="+mn-cs"/>
+      </a:defRPr>
+    </a:lvl8pPr>
+    <a:lvl9pPr marL="3657600" algn="l" defTabSz="914400" rtl="0" eaLnBrk="1" latinLnBrk="0" hangingPunct="1">
+      <a:defRPr sz="1200" kern="1200">
+        <a:solidFill>
+          <a:schemeClr val="tx1"/>
+        </a:solidFill>
+        <a:latin typeface="+mn-lt"/>
+        <a:ea typeface="+mn-ea"/>
+        <a:cs typeface="+mn-cs"/>
+      </a:defRPr>
+    </a:lvl9pPr>
+  </p:notesStyle>
+</p:notesMaster>
 </file>
 
 <file path=ppt/slideLayouts/slideLayout1.xml><?xml version="1.0" encoding="utf-8"?>
@@ -1010,9 +1410,8 @@
           <a:bodyPr/>
           <a:lstStyle/>
           <a:p>
-            <a:fld id="{B61BEF0D-F0BB-DE4B-95CE-6DB70DBA9567}" type="datetimeFigureOut">
-              <a:rPr lang="en-US" dirty="0"/>
-              <a:pPr/>
+            <a:fld id="{E7171913-27B1-4320-9E50-936C82539CDF}" type="datetime1">
+              <a:rPr lang="en-US" smtClean="0"/>
               <a:t>11/8/2019</a:t>
             </a:fld>
             <a:endParaRPr lang="en-US"/>
@@ -1257,9 +1656,8 @@
           <a:bodyPr/>
           <a:lstStyle/>
           <a:p>
-            <a:fld id="{B61BEF0D-F0BB-DE4B-95CE-6DB70DBA9567}" type="datetimeFigureOut">
-              <a:rPr lang="en-US" dirty="0"/>
-              <a:pPr/>
+            <a:fld id="{E890BE3E-F94B-433E-A595-8E67FCD3C36F}" type="datetime1">
+              <a:rPr lang="en-US" smtClean="0"/>
               <a:t>11/8/2019</a:t>
             </a:fld>
             <a:endParaRPr lang="en-US"/>
@@ -1567,9 +1965,8 @@
           <a:bodyPr/>
           <a:lstStyle/>
           <a:p>
-            <a:fld id="{B61BEF0D-F0BB-DE4B-95CE-6DB70DBA9567}" type="datetimeFigureOut">
-              <a:rPr lang="en-US" dirty="0"/>
-              <a:pPr/>
+            <a:fld id="{041A8385-AC8B-47A2-B10A-B7B8BA403C9F}" type="datetime1">
+              <a:rPr lang="en-US" smtClean="0"/>
               <a:t>11/8/2019</a:t>
             </a:fld>
             <a:endParaRPr lang="en-US"/>
@@ -1896,9 +2293,8 @@
           <a:bodyPr/>
           <a:lstStyle/>
           <a:p>
-            <a:fld id="{B61BEF0D-F0BB-DE4B-95CE-6DB70DBA9567}" type="datetimeFigureOut">
-              <a:rPr lang="en-US" dirty="0"/>
-              <a:pPr/>
+            <a:fld id="{1B31FF95-F08A-4593-B0B7-58EE7AD64EB6}" type="datetime1">
+              <a:rPr lang="en-US" smtClean="0"/>
               <a:t>11/8/2019</a:t>
             </a:fld>
             <a:endParaRPr lang="en-US"/>
@@ -2206,9 +2602,8 @@
           <a:bodyPr/>
           <a:lstStyle/>
           <a:p>
-            <a:fld id="{B61BEF0D-F0BB-DE4B-95CE-6DB70DBA9567}" type="datetimeFigureOut">
-              <a:rPr lang="en-US" dirty="0"/>
-              <a:pPr/>
+            <a:fld id="{16D1E0FF-DE87-45C1-9FC4-1702097A784B}" type="datetime1">
+              <a:rPr lang="en-US" smtClean="0"/>
               <a:t>11/8/2019</a:t>
             </a:fld>
             <a:endParaRPr lang="en-US"/>
@@ -2595,9 +2990,8 @@
           <a:bodyPr/>
           <a:lstStyle/>
           <a:p>
-            <a:fld id="{B61BEF0D-F0BB-DE4B-95CE-6DB70DBA9567}" type="datetimeFigureOut">
-              <a:rPr lang="en-US" dirty="0"/>
-              <a:pPr/>
+            <a:fld id="{38BE2EFF-6E8D-493F-A2FB-E891C7C78752}" type="datetime1">
+              <a:rPr lang="en-US" smtClean="0"/>
               <a:t>11/8/2019</a:t>
             </a:fld>
             <a:endParaRPr lang="en-US"/>
@@ -2760,8 +3154,8 @@
           <a:bodyPr/>
           <a:lstStyle/>
           <a:p>
-            <a:fld id="{55C6B4A9-1611-4792-9094-5F34BCA07E0B}" type="datetimeFigureOut">
-              <a:rPr lang="en-US" dirty="0"/>
+            <a:fld id="{6C54343D-3217-4686-97F4-F789B1230D8C}" type="datetime1">
+              <a:rPr lang="en-US" smtClean="0"/>
               <a:t>11/8/2019</a:t>
             </a:fld>
             <a:endParaRPr lang="en-US"/>
@@ -2933,9 +3327,8 @@
           <a:bodyPr/>
           <a:lstStyle/>
           <a:p>
-            <a:fld id="{B61BEF0D-F0BB-DE4B-95CE-6DB70DBA9567}" type="datetimeFigureOut">
-              <a:rPr lang="en-US" dirty="0"/>
-              <a:pPr/>
+            <a:fld id="{B9E84AE4-5D12-4639-AD37-E383248A2E7B}" type="datetime1">
+              <a:rPr lang="en-US" smtClean="0"/>
               <a:t>11/8/2019</a:t>
             </a:fld>
             <a:endParaRPr lang="en-US"/>
@@ -3098,8 +3491,8 @@
           <a:bodyPr/>
           <a:lstStyle/>
           <a:p>
-            <a:fld id="{42A54C80-263E-416B-A8E0-580EDEADCBDC}" type="datetimeFigureOut">
-              <a:rPr lang="en-US" dirty="0"/>
+            <a:fld id="{673E719F-7704-4C71-99B7-E3B147BA87C1}" type="datetime1">
+              <a:rPr lang="en-US" smtClean="0"/>
               <a:t>11/8/2019</a:t>
             </a:fld>
             <a:endParaRPr lang="en-US"/>
@@ -3339,9 +3732,8 @@
           <a:bodyPr/>
           <a:lstStyle/>
           <a:p>
-            <a:fld id="{B61BEF0D-F0BB-DE4B-95CE-6DB70DBA9567}" type="datetimeFigureOut">
-              <a:rPr lang="en-US" dirty="0"/>
-              <a:pPr/>
+            <a:fld id="{F96F1ACE-5097-4ACE-A175-CDB745D30BEF}" type="datetime1">
+              <a:rPr lang="en-US" smtClean="0"/>
               <a:t>11/8/2019</a:t>
             </a:fld>
             <a:endParaRPr lang="en-US"/>
@@ -3565,8 +3957,8 @@
           <a:bodyPr/>
           <a:lstStyle/>
           <a:p>
-            <a:fld id="{42A54C80-263E-416B-A8E0-580EDEADCBDC}" type="datetimeFigureOut">
-              <a:rPr lang="en-US" dirty="0"/>
+            <a:fld id="{45A2F0C3-4A92-4EE5-8B54-A5AF7BCE5789}" type="datetime1">
+              <a:rPr lang="en-US" smtClean="0"/>
               <a:t>11/8/2019</a:t>
             </a:fld>
             <a:endParaRPr lang="en-US"/>
@@ -3931,9 +4323,8 @@
           <a:bodyPr/>
           <a:lstStyle/>
           <a:p>
-            <a:fld id="{B61BEF0D-F0BB-DE4B-95CE-6DB70DBA9567}" type="datetimeFigureOut">
-              <a:rPr lang="en-US" dirty="0"/>
-              <a:pPr/>
+            <a:fld id="{EDF824C6-5C7A-4F5C-92F4-AD7D19C2051A}" type="datetime1">
+              <a:rPr lang="en-US" smtClean="0"/>
               <a:t>11/8/2019</a:t>
             </a:fld>
             <a:endParaRPr lang="en-US"/>
@@ -4050,9 +4441,8 @@
           <a:bodyPr/>
           <a:lstStyle/>
           <a:p>
-            <a:fld id="{B61BEF0D-F0BB-DE4B-95CE-6DB70DBA9567}" type="datetimeFigureOut">
-              <a:rPr lang="en-US" dirty="0"/>
-              <a:pPr/>
+            <a:fld id="{BCD7B128-4B0D-498D-9310-8C5400B692EF}" type="datetime1">
+              <a:rPr lang="en-US" smtClean="0"/>
               <a:t>11/8/2019</a:t>
             </a:fld>
             <a:endParaRPr lang="en-US"/>
@@ -4142,9 +4532,8 @@
           <a:bodyPr/>
           <a:lstStyle/>
           <a:p>
-            <a:fld id="{B61BEF0D-F0BB-DE4B-95CE-6DB70DBA9567}" type="datetimeFigureOut">
-              <a:rPr lang="en-US" dirty="0"/>
-              <a:pPr/>
+            <a:fld id="{332230DE-C891-4779-9DE1-32A3E1250CF2}" type="datetime1">
+              <a:rPr lang="en-US" smtClean="0"/>
               <a:t>11/8/2019</a:t>
             </a:fld>
             <a:endParaRPr lang="en-US"/>
@@ -4392,8 +4781,8 @@
           <a:bodyPr/>
           <a:lstStyle/>
           <a:p>
-            <a:fld id="{42A54C80-263E-416B-A8E0-580EDEADCBDC}" type="datetimeFigureOut">
-              <a:rPr lang="en-US" dirty="0"/>
+            <a:fld id="{BEDADA3C-2671-45F2-A32A-13E50C0E8792}" type="datetime1">
+              <a:rPr lang="en-US" smtClean="0"/>
               <a:t>11/8/2019</a:t>
             </a:fld>
             <a:endParaRPr lang="en-US"/>
@@ -4691,9 +5080,8 @@
           <a:bodyPr/>
           <a:lstStyle/>
           <a:p>
-            <a:fld id="{B61BEF0D-F0BB-DE4B-95CE-6DB70DBA9567}" type="datetimeFigureOut">
-              <a:rPr lang="en-US" dirty="0"/>
-              <a:pPr/>
+            <a:fld id="{0DE102AC-799D-4093-A078-B5081EC322A3}" type="datetime1">
+              <a:rPr lang="en-US" smtClean="0"/>
               <a:t>11/8/2019</a:t>
             </a:fld>
             <a:endParaRPr lang="en-US"/>
@@ -5387,9 +5775,8 @@
             </a:lvl1pPr>
           </a:lstStyle>
           <a:p>
-            <a:fld id="{B61BEF0D-F0BB-DE4B-95CE-6DB70DBA9567}" type="datetimeFigureOut">
-              <a:rPr lang="en-US" dirty="0"/>
-              <a:pPr/>
+            <a:fld id="{9EE1836C-445C-4904-808F-63F31B3C3F3C}" type="datetime1">
+              <a:rPr lang="en-US" smtClean="0"/>
               <a:t>11/8/2019</a:t>
             </a:fld>
             <a:endParaRPr lang="en-US"/>
@@ -5494,6 +5881,7 @@
     <p:sldLayoutId id="2147483668" r:id="rId15"/>
     <p:sldLayoutId id="2147483659" r:id="rId16"/>
   </p:sldLayoutIdLst>
+  <p:hf hdr="0" ftr="0" dt="0"/>
   <p:txStyles>
     <p:titleStyle>
       <a:lvl1pPr algn="l" defTabSz="457200" rtl="0" eaLnBrk="1" latinLnBrk="0" hangingPunct="1">
@@ -6071,6 +6459,35 @@
           </a:p>
         </p:txBody>
       </p:sp>
+      <p:sp>
+        <p:nvSpPr>
+          <p:cNvPr id="3" name="Slide Number Placeholder 2">
+            <a:extLst>
+              <a:ext uri="{FF2B5EF4-FFF2-40B4-BE49-F238E27FC236}">
+                <a16:creationId xmlns:a16="http://schemas.microsoft.com/office/drawing/2014/main" id="{FD5ACB1C-8411-47C2-8BF1-43F7855BDBF4}"/>
+              </a:ext>
+            </a:extLst>
+          </p:cNvPr>
+          <p:cNvSpPr>
+            <a:spLocks noGrp="1"/>
+          </p:cNvSpPr>
+          <p:nvPr>
+            <p:ph type="sldNum" sz="quarter" idx="12"/>
+          </p:nvPr>
+        </p:nvSpPr>
+        <p:spPr/>
+        <p:txBody>
+          <a:bodyPr/>
+          <a:lstStyle/>
+          <a:p>
+            <a:fld id="{519954A3-9DFD-4C44-94BA-B95130A3BA1C}" type="slidenum">
+              <a:rPr lang="en-US" smtClean="0"/>
+              <a:t>2</a:t>
+            </a:fld>
+            <a:endParaRPr lang="en-US"/>
+          </a:p>
+        </p:txBody>
+      </p:sp>
     </p:spTree>
     <p:extLst>
       <p:ext uri="{BB962C8B-B14F-4D97-AF65-F5344CB8AC3E}">
@@ -6190,6 +6607,35 @@
           </a:p>
         </p:txBody>
       </p:sp>
+      <p:sp>
+        <p:nvSpPr>
+          <p:cNvPr id="3" name="Slide Number Placeholder 2">
+            <a:extLst>
+              <a:ext uri="{FF2B5EF4-FFF2-40B4-BE49-F238E27FC236}">
+                <a16:creationId xmlns:a16="http://schemas.microsoft.com/office/drawing/2014/main" id="{D69B6F8B-EB9E-474F-839D-4FCB47A19AD8}"/>
+              </a:ext>
+            </a:extLst>
+          </p:cNvPr>
+          <p:cNvSpPr>
+            <a:spLocks noGrp="1"/>
+          </p:cNvSpPr>
+          <p:nvPr>
+            <p:ph type="sldNum" sz="quarter" idx="12"/>
+          </p:nvPr>
+        </p:nvSpPr>
+        <p:spPr/>
+        <p:txBody>
+          <a:bodyPr/>
+          <a:lstStyle/>
+          <a:p>
+            <a:fld id="{519954A3-9DFD-4C44-94BA-B95130A3BA1C}" type="slidenum">
+              <a:rPr lang="en-US" smtClean="0"/>
+              <a:t>3</a:t>
+            </a:fld>
+            <a:endParaRPr lang="en-US"/>
+          </a:p>
+        </p:txBody>
+      </p:sp>
     </p:spTree>
     <p:extLst>
       <p:ext uri="{BB962C8B-B14F-4D97-AF65-F5344CB8AC3E}">
@@ -6313,6 +6759,35 @@
               <a:buNone/>
             </a:pPr>
             <a:endParaRPr lang="en-US" dirty="0"/>
+          </a:p>
+        </p:txBody>
+      </p:sp>
+      <p:sp>
+        <p:nvSpPr>
+          <p:cNvPr id="3" name="Slide Number Placeholder 2">
+            <a:extLst>
+              <a:ext uri="{FF2B5EF4-FFF2-40B4-BE49-F238E27FC236}">
+                <a16:creationId xmlns:a16="http://schemas.microsoft.com/office/drawing/2014/main" id="{90A1CB41-A576-49E0-8602-D49DAA9551F2}"/>
+              </a:ext>
+            </a:extLst>
+          </p:cNvPr>
+          <p:cNvSpPr>
+            <a:spLocks noGrp="1"/>
+          </p:cNvSpPr>
+          <p:nvPr>
+            <p:ph type="sldNum" sz="quarter" idx="12"/>
+          </p:nvPr>
+        </p:nvSpPr>
+        <p:spPr/>
+        <p:txBody>
+          <a:bodyPr/>
+          <a:lstStyle/>
+          <a:p>
+            <a:fld id="{519954A3-9DFD-4C44-94BA-B95130A3BA1C}" type="slidenum">
+              <a:rPr lang="en-US" smtClean="0"/>
+              <a:t>4</a:t>
+            </a:fld>
+            <a:endParaRPr lang="en-US"/>
           </a:p>
         </p:txBody>
       </p:sp>
@@ -6494,6 +6969,35 @@
           </a:extLst>
         </p:spPr>
       </p:pic>
+      <p:sp>
+        <p:nvSpPr>
+          <p:cNvPr id="3" name="Slide Number Placeholder 2">
+            <a:extLst>
+              <a:ext uri="{FF2B5EF4-FFF2-40B4-BE49-F238E27FC236}">
+                <a16:creationId xmlns:a16="http://schemas.microsoft.com/office/drawing/2014/main" id="{EC43B864-3340-4012-A746-093B424C1BAA}"/>
+              </a:ext>
+            </a:extLst>
+          </p:cNvPr>
+          <p:cNvSpPr>
+            <a:spLocks noGrp="1"/>
+          </p:cNvSpPr>
+          <p:nvPr>
+            <p:ph type="sldNum" sz="quarter" idx="12"/>
+          </p:nvPr>
+        </p:nvSpPr>
+        <p:spPr/>
+        <p:txBody>
+          <a:bodyPr/>
+          <a:lstStyle/>
+          <a:p>
+            <a:fld id="{519954A3-9DFD-4C44-94BA-B95130A3BA1C}" type="slidenum">
+              <a:rPr lang="en-US" smtClean="0"/>
+              <a:t>5</a:t>
+            </a:fld>
+            <a:endParaRPr lang="en-US"/>
+          </a:p>
+        </p:txBody>
+      </p:sp>
     </p:spTree>
     <p:extLst>
       <p:ext uri="{BB962C8B-B14F-4D97-AF65-F5344CB8AC3E}">
@@ -6609,6 +7113,35 @@
           </a:p>
         </p:txBody>
       </p:sp>
+      <p:sp>
+        <p:nvSpPr>
+          <p:cNvPr id="3" name="Slide Number Placeholder 2">
+            <a:extLst>
+              <a:ext uri="{FF2B5EF4-FFF2-40B4-BE49-F238E27FC236}">
+                <a16:creationId xmlns:a16="http://schemas.microsoft.com/office/drawing/2014/main" id="{12AE537D-27A2-422B-8A30-388EA8222FDE}"/>
+              </a:ext>
+            </a:extLst>
+          </p:cNvPr>
+          <p:cNvSpPr>
+            <a:spLocks noGrp="1"/>
+          </p:cNvSpPr>
+          <p:nvPr>
+            <p:ph type="sldNum" sz="quarter" idx="12"/>
+          </p:nvPr>
+        </p:nvSpPr>
+        <p:spPr/>
+        <p:txBody>
+          <a:bodyPr/>
+          <a:lstStyle/>
+          <a:p>
+            <a:fld id="{519954A3-9DFD-4C44-94BA-B95130A3BA1C}" type="slidenum">
+              <a:rPr lang="en-US" smtClean="0"/>
+              <a:t>6</a:t>
+            </a:fld>
+            <a:endParaRPr lang="en-US"/>
+          </a:p>
+        </p:txBody>
+      </p:sp>
     </p:spTree>
     <p:extLst>
       <p:ext uri="{BB962C8B-B14F-4D97-AF65-F5344CB8AC3E}">
@@ -6717,6 +7250,35 @@
           </a:p>
         </p:txBody>
       </p:sp>
+      <p:sp>
+        <p:nvSpPr>
+          <p:cNvPr id="3" name="Slide Number Placeholder 2">
+            <a:extLst>
+              <a:ext uri="{FF2B5EF4-FFF2-40B4-BE49-F238E27FC236}">
+                <a16:creationId xmlns:a16="http://schemas.microsoft.com/office/drawing/2014/main" id="{6B74F4D6-913D-4EB8-8AA8-82659A26557E}"/>
+              </a:ext>
+            </a:extLst>
+          </p:cNvPr>
+          <p:cNvSpPr>
+            <a:spLocks noGrp="1"/>
+          </p:cNvSpPr>
+          <p:nvPr>
+            <p:ph type="sldNum" sz="quarter" idx="12"/>
+          </p:nvPr>
+        </p:nvSpPr>
+        <p:spPr/>
+        <p:txBody>
+          <a:bodyPr/>
+          <a:lstStyle/>
+          <a:p>
+            <a:fld id="{519954A3-9DFD-4C44-94BA-B95130A3BA1C}" type="slidenum">
+              <a:rPr lang="en-US" smtClean="0"/>
+              <a:t>7</a:t>
+            </a:fld>
+            <a:endParaRPr lang="en-US"/>
+          </a:p>
+        </p:txBody>
+      </p:sp>
     </p:spTree>
     <p:extLst>
       <p:ext uri="{BB962C8B-B14F-4D97-AF65-F5344CB8AC3E}">
@@ -6829,10 +7391,164 @@
           </a:p>
         </p:txBody>
       </p:sp>
+      <p:sp>
+        <p:nvSpPr>
+          <p:cNvPr id="5" name="Slide Number Placeholder 4">
+            <a:extLst>
+              <a:ext uri="{FF2B5EF4-FFF2-40B4-BE49-F238E27FC236}">
+                <a16:creationId xmlns:a16="http://schemas.microsoft.com/office/drawing/2014/main" id="{32C996D1-0CBC-4BFE-9F8D-C1024333B8A0}"/>
+              </a:ext>
+            </a:extLst>
+          </p:cNvPr>
+          <p:cNvSpPr>
+            <a:spLocks noGrp="1"/>
+          </p:cNvSpPr>
+          <p:nvPr>
+            <p:ph type="sldNum" sz="quarter" idx="12"/>
+          </p:nvPr>
+        </p:nvSpPr>
+        <p:spPr/>
+        <p:txBody>
+          <a:bodyPr/>
+          <a:lstStyle/>
+          <a:p>
+            <a:fld id="{519954A3-9DFD-4C44-94BA-B95130A3BA1C}" type="slidenum">
+              <a:rPr lang="en-US" smtClean="0"/>
+              <a:t>8</a:t>
+            </a:fld>
+            <a:endParaRPr lang="en-US"/>
+          </a:p>
+        </p:txBody>
+      </p:sp>
     </p:spTree>
     <p:extLst>
       <p:ext uri="{BB962C8B-B14F-4D97-AF65-F5344CB8AC3E}">
         <p14:creationId xmlns:p14="http://schemas.microsoft.com/office/powerpoint/2010/main" val="2211167120"/>
+      </p:ext>
+    </p:extLst>
+  </p:cSld>
+  <p:clrMapOvr>
+    <a:masterClrMapping/>
+  </p:clrMapOvr>
+</p:sld>
+</file>
+
+<file path=ppt/slides/slide9.xml><?xml version="1.0" encoding="utf-8"?>
+<p:sld xmlns:a="http://schemas.openxmlformats.org/drawingml/2006/main" xmlns:r="http://schemas.openxmlformats.org/officeDocument/2006/relationships" xmlns:p="http://schemas.openxmlformats.org/presentationml/2006/main">
+  <p:cSld>
+    <p:spTree>
+      <p:nvGrpSpPr>
+        <p:cNvPr id="1" name=""/>
+        <p:cNvGrpSpPr/>
+        <p:nvPr/>
+      </p:nvGrpSpPr>
+      <p:grpSpPr>
+        <a:xfrm>
+          <a:off x="0" y="0"/>
+          <a:ext cx="0" cy="0"/>
+          <a:chOff x="0" y="0"/>
+          <a:chExt cx="0" cy="0"/>
+        </a:xfrm>
+      </p:grpSpPr>
+      <p:sp>
+        <p:nvSpPr>
+          <p:cNvPr id="2" name="Title 1">
+            <a:extLst>
+              <a:ext uri="{FF2B5EF4-FFF2-40B4-BE49-F238E27FC236}">
+                <a16:creationId xmlns:a16="http://schemas.microsoft.com/office/drawing/2014/main" id="{4B27EB5E-D4FF-48D4-8920-5A742118B292}"/>
+              </a:ext>
+            </a:extLst>
+          </p:cNvPr>
+          <p:cNvSpPr>
+            <a:spLocks noGrp="1"/>
+          </p:cNvSpPr>
+          <p:nvPr>
+            <p:ph type="title"/>
+          </p:nvPr>
+        </p:nvSpPr>
+        <p:spPr/>
+        <p:txBody>
+          <a:bodyPr/>
+          <a:lstStyle/>
+          <a:p>
+            <a:r>
+              <a:rPr lang="en-US" dirty="0"/>
+              <a:t>Recommendations to the Client</a:t>
+            </a:r>
+          </a:p>
+        </p:txBody>
+      </p:sp>
+      <p:sp>
+        <p:nvSpPr>
+          <p:cNvPr id="4" name="Content Placeholder 3">
+            <a:extLst>
+              <a:ext uri="{FF2B5EF4-FFF2-40B4-BE49-F238E27FC236}">
+                <a16:creationId xmlns:a16="http://schemas.microsoft.com/office/drawing/2014/main" id="{A6B6AFB3-D7D5-44EC-A312-CD08B1EBA93D}"/>
+              </a:ext>
+            </a:extLst>
+          </p:cNvPr>
+          <p:cNvSpPr>
+            <a:spLocks noGrp="1"/>
+          </p:cNvSpPr>
+          <p:nvPr>
+            <p:ph idx="1"/>
+          </p:nvPr>
+        </p:nvSpPr>
+        <p:spPr>
+          <a:xfrm>
+            <a:off x="677334" y="1606731"/>
+            <a:ext cx="8596668" cy="5159829"/>
+          </a:xfrm>
+        </p:spPr>
+        <p:txBody>
+          <a:bodyPr>
+            <a:normAutofit/>
+          </a:bodyPr>
+          <a:lstStyle/>
+          <a:p>
+            <a:pPr marL="0" indent="0">
+              <a:buNone/>
+            </a:pPr>
+            <a:r>
+              <a:rPr lang="en-US" dirty="0"/>
+              <a:t>Facebook can use Image captioning functionality to automatically generate captions for photos in the News Feed of people who can't see them. This can be used with text-to-speech engines that allow blind people to use Facebook in other ways</a:t>
+            </a:r>
+          </a:p>
+        </p:txBody>
+      </p:sp>
+      <p:sp>
+        <p:nvSpPr>
+          <p:cNvPr id="5" name="Slide Number Placeholder 4">
+            <a:extLst>
+              <a:ext uri="{FF2B5EF4-FFF2-40B4-BE49-F238E27FC236}">
+                <a16:creationId xmlns:a16="http://schemas.microsoft.com/office/drawing/2014/main" id="{32C996D1-0CBC-4BFE-9F8D-C1024333B8A0}"/>
+              </a:ext>
+            </a:extLst>
+          </p:cNvPr>
+          <p:cNvSpPr>
+            <a:spLocks noGrp="1"/>
+          </p:cNvSpPr>
+          <p:nvPr>
+            <p:ph type="sldNum" sz="quarter" idx="12"/>
+          </p:nvPr>
+        </p:nvSpPr>
+        <p:spPr/>
+        <p:txBody>
+          <a:bodyPr/>
+          <a:lstStyle/>
+          <a:p>
+            <a:fld id="{519954A3-9DFD-4C44-94BA-B95130A3BA1C}" type="slidenum">
+              <a:rPr lang="en-US" smtClean="0"/>
+              <a:t>9</a:t>
+            </a:fld>
+            <a:endParaRPr lang="en-US"/>
+          </a:p>
+        </p:txBody>
+      </p:sp>
+    </p:spTree>
+    <p:extLst>
+      <p:ext uri="{BB962C8B-B14F-4D97-AF65-F5344CB8AC3E}">
+        <p14:creationId xmlns:p14="http://schemas.microsoft.com/office/powerpoint/2010/main" val="811417787"/>
       </p:ext>
     </p:extLst>
   </p:cSld>
@@ -7097,4 +7813,299 @@
     </a:ext>
   </a:extLst>
 </a:theme>
+</file>
+
+<file path=ppt/theme/theme2.xml><?xml version="1.0" encoding="utf-8"?>
+<a:theme xmlns:a="http://schemas.openxmlformats.org/drawingml/2006/main" name="Office Theme">
+  <a:themeElements>
+    <a:clrScheme name="Office">
+      <a:dk1>
+        <a:sysClr val="windowText" lastClr="000000"/>
+      </a:dk1>
+      <a:lt1>
+        <a:sysClr val="window" lastClr="FFFFFF"/>
+      </a:lt1>
+      <a:dk2>
+        <a:srgbClr val="44546A"/>
+      </a:dk2>
+      <a:lt2>
+        <a:srgbClr val="E7E6E6"/>
+      </a:lt2>
+      <a:accent1>
+        <a:srgbClr val="4472C4"/>
+      </a:accent1>
+      <a:accent2>
+        <a:srgbClr val="ED7D31"/>
+      </a:accent2>
+      <a:accent3>
+        <a:srgbClr val="A5A5A5"/>
+      </a:accent3>
+      <a:accent4>
+        <a:srgbClr val="FFC000"/>
+      </a:accent4>
+      <a:accent5>
+        <a:srgbClr val="5B9BD5"/>
+      </a:accent5>
+      <a:accent6>
+        <a:srgbClr val="70AD47"/>
+      </a:accent6>
+      <a:hlink>
+        <a:srgbClr val="0563C1"/>
+      </a:hlink>
+      <a:folHlink>
+        <a:srgbClr val="954F72"/>
+      </a:folHlink>
+    </a:clrScheme>
+    <a:fontScheme name="Office">
+      <a:majorFont>
+        <a:latin typeface="Calibri Light" panose="020F0302020204030204"/>
+        <a:ea typeface=""/>
+        <a:cs typeface=""/>
+        <a:font script="Jpan" typeface="游ゴシック Light"/>
+        <a:font script="Hang" typeface="맑은 고딕"/>
+        <a:font script="Hans" typeface="等线 Light"/>
+        <a:font script="Hant" typeface="新細明體"/>
+        <a:font script="Arab" typeface="Times New Roman"/>
+        <a:font script="Hebr" typeface="Times New Roman"/>
+        <a:font script="Thai" typeface="Angsana New"/>
+        <a:font script="Ethi" typeface="Nyala"/>
+        <a:font script="Beng" typeface="Vrinda"/>
+        <a:font script="Gujr" typeface="Shruti"/>
+        <a:font script="Khmr" typeface="MoolBoran"/>
+        <a:font script="Knda" typeface="Tunga"/>
+        <a:font script="Guru" typeface="Raavi"/>
+        <a:font script="Cans" typeface="Euphemia"/>
+        <a:font script="Cher" typeface="Plantagenet Cherokee"/>
+        <a:font script="Yiii" typeface="Microsoft Yi Baiti"/>
+        <a:font script="Tibt" typeface="Microsoft Himalaya"/>
+        <a:font script="Thaa" typeface="MV Boli"/>
+        <a:font script="Deva" typeface="Mangal"/>
+        <a:font script="Telu" typeface="Gautami"/>
+        <a:font script="Taml" typeface="Latha"/>
+        <a:font script="Syrc" typeface="Estrangelo Edessa"/>
+        <a:font script="Orya" typeface="Kalinga"/>
+        <a:font script="Mlym" typeface="Kartika"/>
+        <a:font script="Laoo" typeface="DokChampa"/>
+        <a:font script="Sinh" typeface="Iskoola Pota"/>
+        <a:font script="Mong" typeface="Mongolian Baiti"/>
+        <a:font script="Viet" typeface="Times New Roman"/>
+        <a:font script="Uigh" typeface="Microsoft Uighur"/>
+        <a:font script="Geor" typeface="Sylfaen"/>
+        <a:font script="Armn" typeface="Arial"/>
+        <a:font script="Bugi" typeface="Leelawadee UI"/>
+        <a:font script="Bopo" typeface="Microsoft JhengHei"/>
+        <a:font script="Java" typeface="Javanese Text"/>
+        <a:font script="Lisu" typeface="Segoe UI"/>
+        <a:font script="Mymr" typeface="Myanmar Text"/>
+        <a:font script="Nkoo" typeface="Ebrima"/>
+        <a:font script="Olck" typeface="Nirmala UI"/>
+        <a:font script="Osma" typeface="Ebrima"/>
+        <a:font script="Phag" typeface="Phagspa"/>
+        <a:font script="Syrn" typeface="Estrangelo Edessa"/>
+        <a:font script="Syrj" typeface="Estrangelo Edessa"/>
+        <a:font script="Syre" typeface="Estrangelo Edessa"/>
+        <a:font script="Sora" typeface="Nirmala UI"/>
+        <a:font script="Tale" typeface="Microsoft Tai Le"/>
+        <a:font script="Talu" typeface="Microsoft New Tai Lue"/>
+        <a:font script="Tfng" typeface="Ebrima"/>
+      </a:majorFont>
+      <a:minorFont>
+        <a:latin typeface="Calibri" panose="020F0502020204030204"/>
+        <a:ea typeface=""/>
+        <a:cs typeface=""/>
+        <a:font script="Jpan" typeface="游ゴシック"/>
+        <a:font script="Hang" typeface="맑은 고딕"/>
+        <a:font script="Hans" typeface="等线"/>
+        <a:font script="Hant" typeface="新細明體"/>
+        <a:font script="Arab" typeface="Arial"/>
+        <a:font script="Hebr" typeface="Arial"/>
+        <a:font script="Thai" typeface="Cordia New"/>
+        <a:font script="Ethi" typeface="Nyala"/>
+        <a:font script="Beng" typeface="Vrinda"/>
+        <a:font script="Gujr" typeface="Shruti"/>
+        <a:font script="Khmr" typeface="DaunPenh"/>
+        <a:font script="Knda" typeface="Tunga"/>
+        <a:font script="Guru" typeface="Raavi"/>
+        <a:font script="Cans" typeface="Euphemia"/>
+        <a:font script="Cher" typeface="Plantagenet Cherokee"/>
+        <a:font script="Yiii" typeface="Microsoft Yi Baiti"/>
+        <a:font script="Tibt" typeface="Microsoft Himalaya"/>
+        <a:font script="Thaa" typeface="MV Boli"/>
+        <a:font script="Deva" typeface="Mangal"/>
+        <a:font script="Telu" typeface="Gautami"/>
+        <a:font script="Taml" typeface="Latha"/>
+        <a:font script="Syrc" typeface="Estrangelo Edessa"/>
+        <a:font script="Orya" typeface="Kalinga"/>
+        <a:font script="Mlym" typeface="Kartika"/>
+        <a:font script="Laoo" typeface="DokChampa"/>
+        <a:font script="Sinh" typeface="Iskoola Pota"/>
+        <a:font script="Mong" typeface="Mongolian Baiti"/>
+        <a:font script="Viet" typeface="Arial"/>
+        <a:font script="Uigh" typeface="Microsoft Uighur"/>
+        <a:font script="Geor" typeface="Sylfaen"/>
+        <a:font script="Armn" typeface="Arial"/>
+        <a:font script="Bugi" typeface="Leelawadee UI"/>
+        <a:font script="Bopo" typeface="Microsoft JhengHei"/>
+        <a:font script="Java" typeface="Javanese Text"/>
+        <a:font script="Lisu" typeface="Segoe UI"/>
+        <a:font script="Mymr" typeface="Myanmar Text"/>
+        <a:font script="Nkoo" typeface="Ebrima"/>
+        <a:font script="Olck" typeface="Nirmala UI"/>
+        <a:font script="Osma" typeface="Ebrima"/>
+        <a:font script="Phag" typeface="Phagspa"/>
+        <a:font script="Syrn" typeface="Estrangelo Edessa"/>
+        <a:font script="Syrj" typeface="Estrangelo Edessa"/>
+        <a:font script="Syre" typeface="Estrangelo Edessa"/>
+        <a:font script="Sora" typeface="Nirmala UI"/>
+        <a:font script="Tale" typeface="Microsoft Tai Le"/>
+        <a:font script="Talu" typeface="Microsoft New Tai Lue"/>
+        <a:font script="Tfng" typeface="Ebrima"/>
+      </a:minorFont>
+    </a:fontScheme>
+    <a:fmtScheme name="Office">
+      <a:fillStyleLst>
+        <a:solidFill>
+          <a:schemeClr val="phClr"/>
+        </a:solidFill>
+        <a:gradFill rotWithShape="1">
+          <a:gsLst>
+            <a:gs pos="0">
+              <a:schemeClr val="phClr">
+                <a:lumMod val="110000"/>
+                <a:satMod val="105000"/>
+                <a:tint val="67000"/>
+              </a:schemeClr>
+            </a:gs>
+            <a:gs pos="50000">
+              <a:schemeClr val="phClr">
+                <a:lumMod val="105000"/>
+                <a:satMod val="103000"/>
+                <a:tint val="73000"/>
+              </a:schemeClr>
+            </a:gs>
+            <a:gs pos="100000">
+              <a:schemeClr val="phClr">
+                <a:lumMod val="105000"/>
+                <a:satMod val="109000"/>
+                <a:tint val="81000"/>
+              </a:schemeClr>
+            </a:gs>
+          </a:gsLst>
+          <a:lin ang="5400000" scaled="0"/>
+        </a:gradFill>
+        <a:gradFill rotWithShape="1">
+          <a:gsLst>
+            <a:gs pos="0">
+              <a:schemeClr val="phClr">
+                <a:satMod val="103000"/>
+                <a:lumMod val="102000"/>
+                <a:tint val="94000"/>
+              </a:schemeClr>
+            </a:gs>
+            <a:gs pos="50000">
+              <a:schemeClr val="phClr">
+                <a:satMod val="110000"/>
+                <a:lumMod val="100000"/>
+                <a:shade val="100000"/>
+              </a:schemeClr>
+            </a:gs>
+            <a:gs pos="100000">
+              <a:schemeClr val="phClr">
+                <a:lumMod val="99000"/>
+                <a:satMod val="120000"/>
+                <a:shade val="78000"/>
+              </a:schemeClr>
+            </a:gs>
+          </a:gsLst>
+          <a:lin ang="5400000" scaled="0"/>
+        </a:gradFill>
+      </a:fillStyleLst>
+      <a:lnStyleLst>
+        <a:ln w="6350" cap="flat" cmpd="sng" algn="ctr">
+          <a:solidFill>
+            <a:schemeClr val="phClr"/>
+          </a:solidFill>
+          <a:prstDash val="solid"/>
+          <a:miter lim="800000"/>
+        </a:ln>
+        <a:ln w="12700" cap="flat" cmpd="sng" algn="ctr">
+          <a:solidFill>
+            <a:schemeClr val="phClr"/>
+          </a:solidFill>
+          <a:prstDash val="solid"/>
+          <a:miter lim="800000"/>
+        </a:ln>
+        <a:ln w="19050" cap="flat" cmpd="sng" algn="ctr">
+          <a:solidFill>
+            <a:schemeClr val="phClr"/>
+          </a:solidFill>
+          <a:prstDash val="solid"/>
+          <a:miter lim="800000"/>
+        </a:ln>
+      </a:lnStyleLst>
+      <a:effectStyleLst>
+        <a:effectStyle>
+          <a:effectLst/>
+        </a:effectStyle>
+        <a:effectStyle>
+          <a:effectLst/>
+        </a:effectStyle>
+        <a:effectStyle>
+          <a:effectLst>
+            <a:outerShdw blurRad="57150" dist="19050" dir="5400000" algn="ctr" rotWithShape="0">
+              <a:srgbClr val="000000">
+                <a:alpha val="63000"/>
+              </a:srgbClr>
+            </a:outerShdw>
+          </a:effectLst>
+        </a:effectStyle>
+      </a:effectStyleLst>
+      <a:bgFillStyleLst>
+        <a:solidFill>
+          <a:schemeClr val="phClr"/>
+        </a:solidFill>
+        <a:solidFill>
+          <a:schemeClr val="phClr">
+            <a:tint val="95000"/>
+            <a:satMod val="170000"/>
+          </a:schemeClr>
+        </a:solidFill>
+        <a:gradFill rotWithShape="1">
+          <a:gsLst>
+            <a:gs pos="0">
+              <a:schemeClr val="phClr">
+                <a:tint val="93000"/>
+                <a:satMod val="150000"/>
+                <a:shade val="98000"/>
+                <a:lumMod val="102000"/>
+              </a:schemeClr>
+            </a:gs>
+            <a:gs pos="50000">
+              <a:schemeClr val="phClr">
+                <a:tint val="98000"/>
+                <a:satMod val="130000"/>
+                <a:shade val="90000"/>
+                <a:lumMod val="103000"/>
+              </a:schemeClr>
+            </a:gs>
+            <a:gs pos="100000">
+              <a:schemeClr val="phClr">
+                <a:shade val="63000"/>
+                <a:satMod val="120000"/>
+              </a:schemeClr>
+            </a:gs>
+          </a:gsLst>
+          <a:lin ang="5400000" scaled="0"/>
+        </a:gradFill>
+      </a:bgFillStyleLst>
+    </a:fmtScheme>
+  </a:themeElements>
+  <a:objectDefaults/>
+  <a:extraClrSchemeLst/>
+  <a:extLst>
+    <a:ext uri="{05A4C25C-085E-4340-85A3-A5531E510DB2}">
+      <thm15:themeFamily xmlns:thm15="http://schemas.microsoft.com/office/thememl/2012/main" name="Office Theme" id="{62F939B6-93AF-4DB8-9C6B-D6C7DFDC589F}" vid="{4A3C46E8-61CC-4603-A589-7422A47A8E4A}"/>
+    </a:ext>
+  </a:extLst>
+</a:theme>
 </file>
</xml_diff>